<commit_message>
Cleaned up Visual Studio solution and adjusted package.json + webpack.config.js.
</commit_message>
<xml_diff>
--- a/notes/Presentation.pptx
+++ b/notes/Presentation.pptx
@@ -5,19 +5,20 @@
     <p:sldMasterId id="2147483648" r:id="rId1"/>
   </p:sldMasterIdLst>
   <p:notesMasterIdLst>
-    <p:notesMasterId r:id="rId4"/>
+    <p:notesMasterId r:id="rId5"/>
   </p:notesMasterIdLst>
   <p:handoutMasterIdLst>
-    <p:handoutMasterId r:id="rId5"/>
+    <p:handoutMasterId r:id="rId6"/>
   </p:handoutMasterIdLst>
   <p:sldIdLst>
     <p:sldId id="256" r:id="rId2"/>
     <p:sldId id="257" r:id="rId3"/>
+    <p:sldId id="258" r:id="rId4"/>
   </p:sldIdLst>
   <p:sldSz cx="12192000" cy="6858000"/>
   <p:notesSz cx="6797675" cy="9926638"/>
   <p:custDataLst>
-    <p:tags r:id="rId6"/>
+    <p:tags r:id="rId7"/>
   </p:custDataLst>
   <p:defaultTextStyle>
     <a:defPPr>
@@ -2218,7 +2219,7 @@
           <a:graphicData uri="http://schemas.openxmlformats.org/presentationml/2006/ole">
             <mc:AlternateContent xmlns:mc="http://schemas.openxmlformats.org/markup-compatibility/2006">
               <mc:Choice xmlns:v="urn:schemas-microsoft-com:vml" Requires="v">
-                <p:oleObj spid="_x0000_s1095" name="think-cell Slide" r:id="rId11" imgW="473" imgH="473" progId="TCLayout.ActiveDocument.1">
+                <p:oleObj spid="_x0000_s1097" name="think-cell Slide" r:id="rId11" imgW="473" imgH="473" progId="TCLayout.ActiveDocument.1">
                   <p:embed/>
                 </p:oleObj>
               </mc:Choice>
@@ -3064,9 +3065,24 @@
           </a:p>
           <a:p>
             <a:r>
-              <a:rPr lang="en-GB"/>
+              <a:rPr lang="en-GB" dirty="0"/>
               <a:t>Part II</a:t>
             </a:r>
+          </a:p>
+          <a:p>
+            <a:pPr lvl="1"/>
+            <a:r>
+              <a:rPr lang="en-GB" dirty="0"/>
+              <a:t>Visual Studio</a:t>
+            </a:r>
+          </a:p>
+          <a:p>
+            <a:pPr lvl="1"/>
+            <a:endParaRPr lang="en-GB" dirty="0"/>
+          </a:p>
+          <a:p>
+            <a:pPr lvl="1"/>
+            <a:endParaRPr lang="en-GB" dirty="0"/>
           </a:p>
           <a:p>
             <a:pPr lvl="1"/>
@@ -3109,6 +3125,101 @@
     <p:extLst>
       <p:ext uri="{BB962C8B-B14F-4D97-AF65-F5344CB8AC3E}">
         <p14:creationId xmlns:p14="http://schemas.microsoft.com/office/powerpoint/2010/main" val="4085506166"/>
+      </p:ext>
+    </p:extLst>
+  </p:cSld>
+  <p:clrMapOvr>
+    <a:masterClrMapping/>
+  </p:clrMapOvr>
+</p:sld>
+</file>
+
+<file path=ppt/slides/slide3.xml><?xml version="1.0" encoding="utf-8"?>
+<p:sld xmlns:a="http://schemas.openxmlformats.org/drawingml/2006/main" xmlns:r="http://schemas.openxmlformats.org/officeDocument/2006/relationships" xmlns:p="http://schemas.openxmlformats.org/presentationml/2006/main">
+  <p:cSld>
+    <p:spTree>
+      <p:nvGrpSpPr>
+        <p:cNvPr id="1" name=""/>
+        <p:cNvGrpSpPr/>
+        <p:nvPr/>
+      </p:nvGrpSpPr>
+      <p:grpSpPr>
+        <a:xfrm>
+          <a:off x="0" y="0"/>
+          <a:ext cx="0" cy="0"/>
+          <a:chOff x="0" y="0"/>
+          <a:chExt cx="0" cy="0"/>
+        </a:xfrm>
+      </p:grpSpPr>
+      <p:sp>
+        <p:nvSpPr>
+          <p:cNvPr id="2" name="Title 1"/>
+          <p:cNvSpPr>
+            <a:spLocks noGrp="1"/>
+          </p:cNvSpPr>
+          <p:nvPr>
+            <p:ph type="title"/>
+          </p:nvPr>
+        </p:nvSpPr>
+        <p:spPr/>
+        <p:txBody>
+          <a:bodyPr/>
+          <a:lstStyle/>
+          <a:p>
+            <a:r>
+              <a:rPr lang="da-DK" dirty="0"/>
+              <a:t>ASP.NET Core</a:t>
+            </a:r>
+          </a:p>
+        </p:txBody>
+      </p:sp>
+      <p:sp>
+        <p:nvSpPr>
+          <p:cNvPr id="3" name="Content Placeholder 2"/>
+          <p:cNvSpPr>
+            <a:spLocks noGrp="1"/>
+          </p:cNvSpPr>
+          <p:nvPr>
+            <p:ph idx="1"/>
+          </p:nvPr>
+        </p:nvSpPr>
+        <p:spPr/>
+        <p:txBody>
+          <a:bodyPr/>
+          <a:lstStyle/>
+          <a:p>
+            <a:endParaRPr lang="da-DK"/>
+          </a:p>
+        </p:txBody>
+      </p:sp>
+      <p:sp>
+        <p:nvSpPr>
+          <p:cNvPr id="4" name="Slide Number Placeholder 3"/>
+          <p:cNvSpPr>
+            <a:spLocks noGrp="1"/>
+          </p:cNvSpPr>
+          <p:nvPr>
+            <p:ph type="sldNum" sz="quarter" idx="12"/>
+          </p:nvPr>
+        </p:nvSpPr>
+        <p:spPr/>
+        <p:txBody>
+          <a:bodyPr/>
+          <a:lstStyle/>
+          <a:p>
+            <a:fld id="{0B0DDA44-FDCB-445C-9AC0-37FB199E677B}" type="slidenum">
+              <a:rPr lang="en-US" smtClean="0"/>
+              <a:pPr/>
+              <a:t>3</a:t>
+            </a:fld>
+            <a:endParaRPr lang="en-US" dirty="0"/>
+          </a:p>
+        </p:txBody>
+      </p:sp>
+    </p:spTree>
+    <p:extLst>
+      <p:ext uri="{BB962C8B-B14F-4D97-AF65-F5344CB8AC3E}">
+        <p14:creationId xmlns:p14="http://schemas.microsoft.com/office/powerpoint/2010/main" val="3242514119"/>
       </p:ext>
     </p:extLst>
   </p:cSld>

</xml_diff>